<commit_message>
final changes from 2016
</commit_message>
<xml_diff>
--- a/Lectures/18 Machine Learning III Big Data.pptx
+++ b/Lectures/18 Machine Learning III Big Data.pptx
@@ -229,7 +229,7 @@
           <a:p>
             <a:fld id="{D3AAB66F-B1B7-D045-B4E8-4F60236F228D}" type="datetimeFigureOut">
               <a:rPr lang="en-US" smtClean="0"/>
-              <a:t>3/28/16</a:t>
+              <a:t>4/7/16</a:t>
             </a:fld>
             <a:endParaRPr lang="en-US"/>
           </a:p>
@@ -395,7 +395,7 @@
           <a:p>
             <a:fld id="{BCCF8E76-06A6-164E-A6FA-EC32C13EB232}" type="datetimeFigureOut">
               <a:rPr lang="en-US" smtClean="0"/>
-              <a:t>3/28/16</a:t>
+              <a:t>4/7/16</a:t>
             </a:fld>
             <a:endParaRPr lang="en-US"/>
           </a:p>
@@ -708,6 +708,10 @@
           <a:bodyPr/>
           <a:lstStyle/>
           <a:p>
+            <a:r>
+              <a:rPr lang="en-US" smtClean="0"/>
+              <a:t>   </a:t>
+            </a:r>
             <a:endParaRPr lang="en-US" dirty="0"/>
           </a:p>
         </p:txBody>
@@ -3988,7 +3992,7 @@
             <a:fld id="{FA3C144B-2939-9A49-B014-915EC3E81866}" type="datetime1">
               <a:rPr lang="en-US" smtClean="0"/>
               <a:pPr/>
-              <a:t>3/28/16</a:t>
+              <a:t>4/7/16</a:t>
             </a:fld>
             <a:endParaRPr lang="en-US" dirty="0"/>
           </a:p>
@@ -4417,7 +4421,7 @@
           <a:p>
             <a:fld id="{76838339-A875-5E45-AB3F-AAABD270346A}" type="datetime1">
               <a:rPr lang="en-US" smtClean="0"/>
-              <a:t>3/28/16</a:t>
+              <a:t>4/7/16</a:t>
             </a:fld>
             <a:endParaRPr lang="en-US"/>
           </a:p>
@@ -4703,7 +4707,7 @@
             <a:fld id="{FA3C144B-2939-9A49-B014-915EC3E81866}" type="datetime1">
               <a:rPr lang="en-US" smtClean="0"/>
               <a:pPr/>
-              <a:t>3/28/16</a:t>
+              <a:t>4/7/16</a:t>
             </a:fld>
             <a:endParaRPr lang="en-US" dirty="0"/>
           </a:p>
@@ -5185,7 +5189,7 @@
           <a:p>
             <a:fld id="{A73F672F-A5FB-5745-934A-1BF51CA5539C}" type="datetime1">
               <a:rPr lang="en-US" smtClean="0"/>
-              <a:t>3/28/16</a:t>
+              <a:t>4/7/16</a:t>
             </a:fld>
             <a:endParaRPr lang="en-US"/>
           </a:p>
@@ -5527,7 +5531,7 @@
             <a:fld id="{FA3C144B-2939-9A49-B014-915EC3E81866}" type="datetime1">
               <a:rPr lang="en-US" smtClean="0"/>
               <a:pPr/>
-              <a:t>3/28/16</a:t>
+              <a:t>4/7/16</a:t>
             </a:fld>
             <a:endParaRPr lang="en-US" dirty="0"/>
           </a:p>
@@ -5991,7 +5995,7 @@
           <a:p>
             <a:fld id="{6AFE6A63-5EBE-3E48-B0AE-DF655A1ECE76}" type="datetime1">
               <a:rPr lang="en-US" smtClean="0"/>
-              <a:t>3/28/16</a:t>
+              <a:t>4/7/16</a:t>
             </a:fld>
             <a:endParaRPr lang="en-US"/>
           </a:p>
@@ -6310,7 +6314,7 @@
           <a:p>
             <a:fld id="{4A019F0C-9D18-B54A-9AC9-18AA74EDB034}" type="datetime1">
               <a:rPr lang="en-US" smtClean="0"/>
-              <a:t>3/28/16</a:t>
+              <a:t>4/7/16</a:t>
             </a:fld>
             <a:endParaRPr lang="en-US"/>
           </a:p>
@@ -6620,7 +6624,7 @@
             <a:fld id="{FA3C144B-2939-9A49-B014-915EC3E81866}" type="datetime1">
               <a:rPr lang="en-US" smtClean="0"/>
               <a:pPr/>
-              <a:t>3/28/16</a:t>
+              <a:t>4/7/16</a:t>
             </a:fld>
             <a:endParaRPr lang="en-US" dirty="0"/>
           </a:p>
@@ -6883,7 +6887,7 @@
           <a:p>
             <a:fld id="{FA3C144B-2939-9A49-B014-915EC3E81866}" type="datetime1">
               <a:rPr lang="en-US" smtClean="0"/>
-              <a:t>3/28/16</a:t>
+              <a:t>4/7/16</a:t>
             </a:fld>
             <a:endParaRPr lang="en-US" dirty="0"/>
           </a:p>
@@ -7337,7 +7341,7 @@
           <a:p>
             <a:fld id="{7053BEFA-1175-F644-B249-7D41D72BD3FF}" type="datetime1">
               <a:rPr lang="en-US" smtClean="0"/>
-              <a:t>3/28/16</a:t>
+              <a:t>4/7/16</a:t>
             </a:fld>
             <a:endParaRPr lang="en-US"/>
           </a:p>
@@ -7456,7 +7460,7 @@
             <a:fld id="{FA3C144B-2939-9A49-B014-915EC3E81866}" type="datetime1">
               <a:rPr lang="en-US" smtClean="0"/>
               <a:pPr/>
-              <a:t>3/28/16</a:t>
+              <a:t>4/7/16</a:t>
             </a:fld>
             <a:endParaRPr lang="en-US" dirty="0"/>
           </a:p>
@@ -7673,7 +7677,7 @@
             <a:fld id="{FA3C144B-2939-9A49-B014-915EC3E81866}" type="datetime1">
               <a:rPr lang="en-US" smtClean="0"/>
               <a:pPr/>
-              <a:t>3/28/16</a:t>
+              <a:t>4/7/16</a:t>
             </a:fld>
             <a:endParaRPr lang="en-US" dirty="0"/>
           </a:p>
@@ -7918,7 +7922,7 @@
             <a:fld id="{FA3C144B-2939-9A49-B014-915EC3E81866}" type="datetime1">
               <a:rPr lang="en-US" smtClean="0"/>
               <a:pPr/>
-              <a:t>3/28/16</a:t>
+              <a:t>4/7/16</a:t>
             </a:fld>
             <a:endParaRPr lang="en-US" dirty="0"/>
           </a:p>
@@ -8296,7 +8300,7 @@
           <a:p>
             <a:fld id="{111EEF3B-ABF2-AA4E-9E24-0C6256942674}" type="datetime1">
               <a:rPr lang="en-US" smtClean="0"/>
-              <a:t>3/28/16</a:t>
+              <a:t>4/7/16</a:t>
             </a:fld>
             <a:endParaRPr lang="en-US"/>
           </a:p>
@@ -8460,7 +8464,7 @@
             <a:fld id="{FA3C144B-2939-9A49-B014-915EC3E81866}" type="datetime1">
               <a:rPr lang="en-US" smtClean="0"/>
               <a:pPr/>
-              <a:t>3/28/16</a:t>
+              <a:t>4/7/16</a:t>
             </a:fld>
             <a:endParaRPr lang="en-US" dirty="0"/>
           </a:p>
@@ -8877,7 +8881,7 @@
             <a:fld id="{FA3C144B-2939-9A49-B014-915EC3E81866}" type="datetime1">
               <a:rPr lang="en-US" smtClean="0"/>
               <a:pPr/>
-              <a:t>3/28/16</a:t>
+              <a:t>4/7/16</a:t>
             </a:fld>
             <a:endParaRPr lang="en-US" dirty="0"/>
           </a:p>
@@ -9193,7 +9197,7 @@
             <a:fld id="{FA3C144B-2939-9A49-B014-915EC3E81866}" type="datetime1">
               <a:rPr lang="en-US" smtClean="0"/>
               <a:pPr/>
-              <a:t>3/28/16</a:t>
+              <a:t>4/7/16</a:t>
             </a:fld>
             <a:endParaRPr lang="en-US" dirty="0"/>
           </a:p>
@@ -9859,7 +9863,7 @@
             <a:fld id="{FA3C144B-2939-9A49-B014-915EC3E81866}" type="datetime1">
               <a:rPr lang="en-US" smtClean="0"/>
               <a:pPr/>
-              <a:t>3/28/16</a:t>
+              <a:t>4/7/16</a:t>
             </a:fld>
             <a:endParaRPr lang="en-US" dirty="0"/>
           </a:p>
@@ -10586,15 +10590,7 @@
           <a:p>
             <a:r>
               <a:rPr lang="en-US" dirty="0" smtClean="0"/>
-              <a:t>Machine Learning </a:t>
-            </a:r>
-            <a:r>
-              <a:rPr lang="en-US" dirty="0" smtClean="0"/>
-              <a:t>III: </a:t>
-            </a:r>
-            <a:r>
-              <a:rPr lang="en-US" dirty="0" smtClean="0"/>
-              <a:t/>
+              <a:t>Machine Learning III: </a:t>
             </a:r>
             <a:br>
               <a:rPr lang="en-US" dirty="0" smtClean="0"/>
@@ -10661,13 +10657,8 @@
           <a:p>
             <a:r>
               <a:rPr lang="en-US" dirty="0" smtClean="0"/>
-              <a:t>The Data Pipeline; HCII; Spring </a:t>
-            </a:r>
-            <a:r>
-              <a:rPr lang="en-US" dirty="0" smtClean="0"/>
-              <a:t>2016</a:t>
-            </a:r>
-            <a:endParaRPr lang="en-US" dirty="0" smtClean="0"/>
+              <a:t>The Data Pipeline; HCII; Spring 2016</a:t>
+            </a:r>
           </a:p>
           <a:p>
             <a:endParaRPr lang="en-US" dirty="0"/>
@@ -11310,7 +11301,7 @@
           <a:p>
             <a:fld id="{7053BEFA-1175-F644-B249-7D41D72BD3FF}" type="datetime1">
               <a:rPr lang="en-US" smtClean="0"/>
-              <a:t>3/28/16</a:t>
+              <a:t>4/7/16</a:t>
             </a:fld>
             <a:endParaRPr lang="en-US"/>
           </a:p>
@@ -11380,7 +11371,7 @@
           <a:graphicData uri="http://schemas.openxmlformats.org/presentationml/2006/ole">
             <mc:AlternateContent xmlns:mc="http://schemas.openxmlformats.org/markup-compatibility/2006">
               <mc:Choice xmlns:v="urn:schemas-microsoft-com:vml" Requires="v">
-                <p:oleObj spid="_x0000_s771242" name="Equation" r:id="rId4" imgW="1943100" imgH="457200" progId="Equation.3">
+                <p:oleObj spid="_x0000_s771245" name="Equation" r:id="rId4" imgW="1943100" imgH="457200" progId="Equation.3">
                   <p:embed/>
                 </p:oleObj>
               </mc:Choice>
@@ -11437,7 +11428,7 @@
           <a:graphicData uri="http://schemas.openxmlformats.org/presentationml/2006/ole">
             <mc:AlternateContent xmlns:mc="http://schemas.openxmlformats.org/markup-compatibility/2006">
               <mc:Choice xmlns:v="urn:schemas-microsoft-com:vml" Requires="v">
-                <p:oleObj spid="_x0000_s771243" name="Equation" r:id="rId6" imgW="1778000" imgH="254000" progId="Equation.3">
+                <p:oleObj spid="_x0000_s771246" name="Equation" r:id="rId6" imgW="1778000" imgH="254000" progId="Equation.3">
                   <p:embed/>
                 </p:oleObj>
               </mc:Choice>
@@ -11893,7 +11884,7 @@
           <a:p>
             <a:fld id="{7053BEFA-1175-F644-B249-7D41D72BD3FF}" type="datetime1">
               <a:rPr lang="en-US" smtClean="0"/>
-              <a:t>3/28/16</a:t>
+              <a:t>4/7/16</a:t>
             </a:fld>
             <a:endParaRPr lang="en-US"/>
           </a:p>
@@ -12788,7 +12779,7 @@
           <a:p>
             <a:fld id="{7053BEFA-1175-F644-B249-7D41D72BD3FF}" type="datetime1">
               <a:rPr lang="en-US" smtClean="0"/>
-              <a:t>3/28/16</a:t>
+              <a:t>4/7/16</a:t>
             </a:fld>
             <a:endParaRPr lang="en-US"/>
           </a:p>
@@ -13808,7 +13799,7 @@
           <a:p>
             <a:fld id="{7053BEFA-1175-F644-B249-7D41D72BD3FF}" type="datetime1">
               <a:rPr lang="en-US" smtClean="0"/>
-              <a:t>3/28/16</a:t>
+              <a:t>4/7/16</a:t>
             </a:fld>
             <a:endParaRPr lang="en-US"/>
           </a:p>
@@ -14828,7 +14819,7 @@
           <a:p>
             <a:fld id="{7053BEFA-1175-F644-B249-7D41D72BD3FF}" type="datetime1">
               <a:rPr lang="en-US" smtClean="0"/>
-              <a:t>3/28/16</a:t>
+              <a:t>4/7/16</a:t>
             </a:fld>
             <a:endParaRPr lang="en-US"/>
           </a:p>
@@ -15976,7 +15967,7 @@
           <a:p>
             <a:fld id="{7053BEFA-1175-F644-B249-7D41D72BD3FF}" type="datetime1">
               <a:rPr lang="en-US" smtClean="0"/>
-              <a:t>3/28/16</a:t>
+              <a:t>4/7/16</a:t>
             </a:fld>
             <a:endParaRPr lang="en-US"/>
           </a:p>
@@ -16704,7 +16695,7 @@
           <a:p>
             <a:fld id="{7053BEFA-1175-F644-B249-7D41D72BD3FF}" type="datetime1">
               <a:rPr lang="en-US" smtClean="0"/>
-              <a:t>3/28/16</a:t>
+              <a:t>4/7/16</a:t>
             </a:fld>
             <a:endParaRPr lang="en-US"/>
           </a:p>
@@ -17327,7 +17318,7 @@
           <a:p>
             <a:fld id="{7053BEFA-1175-F644-B249-7D41D72BD3FF}" type="datetime1">
               <a:rPr lang="en-US" smtClean="0"/>
-              <a:t>3/28/16</a:t>
+              <a:t>4/7/16</a:t>
             </a:fld>
             <a:endParaRPr lang="en-US"/>
           </a:p>
@@ -18043,7 +18034,7 @@
           <a:p>
             <a:fld id="{7053BEFA-1175-F644-B249-7D41D72BD3FF}" type="datetime1">
               <a:rPr lang="en-US" smtClean="0"/>
-              <a:t>3/28/16</a:t>
+              <a:t>4/7/16</a:t>
             </a:fld>
             <a:endParaRPr lang="en-US"/>
           </a:p>
@@ -18763,7 +18754,7 @@
           <a:p>
             <a:fld id="{7053BEFA-1175-F644-B249-7D41D72BD3FF}" type="datetime1">
               <a:rPr lang="en-US" smtClean="0"/>
-              <a:t>3/28/16</a:t>
+              <a:t>4/7/16</a:t>
             </a:fld>
             <a:endParaRPr lang="en-US"/>
           </a:p>
@@ -19200,7 +19191,7 @@
           <a:p>
             <a:fld id="{7053BEFA-1175-F644-B249-7D41D72BD3FF}" type="datetime1">
               <a:rPr lang="en-US" smtClean="0"/>
-              <a:t>3/28/16</a:t>
+              <a:t>4/7/16</a:t>
             </a:fld>
             <a:endParaRPr lang="en-US"/>
           </a:p>
@@ -19823,7 +19814,7 @@
           <a:p>
             <a:fld id="{7053BEFA-1175-F644-B249-7D41D72BD3FF}" type="datetime1">
               <a:rPr lang="en-US" smtClean="0"/>
-              <a:t>3/28/16</a:t>
+              <a:t>4/7/16</a:t>
             </a:fld>
             <a:endParaRPr lang="en-US"/>
           </a:p>
@@ -20643,7 +20634,7 @@
           <a:p>
             <a:fld id="{7053BEFA-1175-F644-B249-7D41D72BD3FF}" type="datetime1">
               <a:rPr lang="en-US" smtClean="0"/>
-              <a:t>3/28/16</a:t>
+              <a:t>4/7/16</a:t>
             </a:fld>
             <a:endParaRPr lang="en-US"/>
           </a:p>
@@ -21463,7 +21454,7 @@
           <a:p>
             <a:fld id="{7053BEFA-1175-F644-B249-7D41D72BD3FF}" type="datetime1">
               <a:rPr lang="en-US" smtClean="0"/>
-              <a:t>3/28/16</a:t>
+              <a:t>4/7/16</a:t>
             </a:fld>
             <a:endParaRPr lang="en-US"/>
           </a:p>
@@ -22290,7 +22281,7 @@
           <a:p>
             <a:fld id="{7053BEFA-1175-F644-B249-7D41D72BD3FF}" type="datetime1">
               <a:rPr lang="en-US" smtClean="0"/>
-              <a:t>3/28/16</a:t>
+              <a:t>4/7/16</a:t>
             </a:fld>
             <a:endParaRPr lang="en-US"/>
           </a:p>
@@ -23527,7 +23518,7 @@
           <a:p>
             <a:fld id="{7053BEFA-1175-F644-B249-7D41D72BD3FF}" type="datetime1">
               <a:rPr lang="en-US" smtClean="0"/>
-              <a:t>3/28/16</a:t>
+              <a:t>4/7/16</a:t>
             </a:fld>
             <a:endParaRPr lang="en-US"/>
           </a:p>
@@ -24788,7 +24779,7 @@
           <a:p>
             <a:fld id="{7053BEFA-1175-F644-B249-7D41D72BD3FF}" type="datetime1">
               <a:rPr lang="en-US" smtClean="0"/>
-              <a:t>3/28/16</a:t>
+              <a:t>4/7/16</a:t>
             </a:fld>
             <a:endParaRPr lang="en-US"/>
           </a:p>
@@ -25952,7 +25943,7 @@
           <a:p>
             <a:fld id="{7053BEFA-1175-F644-B249-7D41D72BD3FF}" type="datetime1">
               <a:rPr lang="en-US" smtClean="0"/>
-              <a:t>3/28/16</a:t>
+              <a:t>4/7/16</a:t>
             </a:fld>
             <a:endParaRPr lang="en-US"/>
           </a:p>
@@ -27061,7 +27052,7 @@
           <a:p>
             <a:fld id="{7053BEFA-1175-F644-B249-7D41D72BD3FF}" type="datetime1">
               <a:rPr lang="en-US" smtClean="0"/>
-              <a:t>3/28/16</a:t>
+              <a:t>4/7/16</a:t>
             </a:fld>
             <a:endParaRPr lang="en-US"/>
           </a:p>
@@ -27688,7 +27679,7 @@
           <a:p>
             <a:fld id="{7053BEFA-1175-F644-B249-7D41D72BD3FF}" type="datetime1">
               <a:rPr lang="en-US" smtClean="0"/>
-              <a:t>3/28/16</a:t>
+              <a:t>4/7/16</a:t>
             </a:fld>
             <a:endParaRPr lang="en-US"/>
           </a:p>
@@ -28323,7 +28314,7 @@
           <a:p>
             <a:fld id="{7053BEFA-1175-F644-B249-7D41D72BD3FF}" type="datetime1">
               <a:rPr lang="en-US" smtClean="0"/>
-              <a:t>3/28/16</a:t>
+              <a:t>4/7/16</a:t>
             </a:fld>
             <a:endParaRPr lang="en-US"/>
           </a:p>
@@ -28843,7 +28834,7 @@
           <a:p>
             <a:fld id="{7053BEFA-1175-F644-B249-7D41D72BD3FF}" type="datetime1">
               <a:rPr lang="en-US" smtClean="0"/>
-              <a:t>3/28/16</a:t>
+              <a:t>4/7/16</a:t>
             </a:fld>
             <a:endParaRPr lang="en-US"/>
           </a:p>
@@ -29411,7 +29402,7 @@
           <a:p>
             <a:fld id="{7053BEFA-1175-F644-B249-7D41D72BD3FF}" type="datetime1">
               <a:rPr lang="en-US" smtClean="0"/>
-              <a:t>3/28/16</a:t>
+              <a:t>4/7/16</a:t>
             </a:fld>
             <a:endParaRPr lang="en-US"/>
           </a:p>
@@ -30054,7 +30045,7 @@
           <a:p>
             <a:fld id="{7053BEFA-1175-F644-B249-7D41D72BD3FF}" type="datetime1">
               <a:rPr lang="en-US" smtClean="0"/>
-              <a:t>3/28/16</a:t>
+              <a:t>4/7/16</a:t>
             </a:fld>
             <a:endParaRPr lang="en-US"/>
           </a:p>
@@ -30800,7 +30791,7 @@
           <a:p>
             <a:fld id="{7053BEFA-1175-F644-B249-7D41D72BD3FF}" type="datetime1">
               <a:rPr lang="en-US" smtClean="0"/>
-              <a:t>3/28/16</a:t>
+              <a:t>4/7/16</a:t>
             </a:fld>
             <a:endParaRPr lang="en-US"/>
           </a:p>
@@ -31554,7 +31545,7 @@
           <a:p>
             <a:fld id="{7053BEFA-1175-F644-B249-7D41D72BD3FF}" type="datetime1">
               <a:rPr lang="en-US" smtClean="0"/>
-              <a:t>3/28/16</a:t>
+              <a:t>4/7/16</a:t>
             </a:fld>
             <a:endParaRPr lang="en-US"/>
           </a:p>
@@ -32300,7 +32291,7 @@
           <a:p>
             <a:fld id="{7053BEFA-1175-F644-B249-7D41D72BD3FF}" type="datetime1">
               <a:rPr lang="en-US" smtClean="0"/>
-              <a:t>3/28/16</a:t>
+              <a:t>4/7/16</a:t>
             </a:fld>
             <a:endParaRPr lang="en-US"/>
           </a:p>
@@ -32606,7 +32597,7 @@
           <a:p>
             <a:fld id="{7053BEFA-1175-F644-B249-7D41D72BD3FF}" type="datetime1">
               <a:rPr lang="en-US" smtClean="0"/>
-              <a:t>3/28/16</a:t>
+              <a:t>4/7/16</a:t>
             </a:fld>
             <a:endParaRPr lang="en-US"/>
           </a:p>
@@ -33075,7 +33066,7 @@
           <a:p>
             <a:fld id="{7053BEFA-1175-F644-B249-7D41D72BD3FF}" type="datetime1">
               <a:rPr lang="en-US" smtClean="0"/>
-              <a:t>3/28/16</a:t>
+              <a:t>4/7/16</a:t>
             </a:fld>
             <a:endParaRPr lang="en-US"/>
           </a:p>
@@ -33416,7 +33407,7 @@
           <a:p>
             <a:fld id="{7053BEFA-1175-F644-B249-7D41D72BD3FF}" type="datetime1">
               <a:rPr lang="en-US" smtClean="0"/>
-              <a:t>3/28/16</a:t>
+              <a:t>4/7/16</a:t>
             </a:fld>
             <a:endParaRPr lang="en-US"/>
           </a:p>
@@ -33777,7 +33768,7 @@
           <a:graphicData uri="http://schemas.openxmlformats.org/presentationml/2006/ole">
             <mc:AlternateContent xmlns:mc="http://schemas.openxmlformats.org/markup-compatibility/2006">
               <mc:Choice xmlns:v="urn:schemas-microsoft-com:vml" Requires="v">
-                <p:oleObj spid="_x0000_s762026" name="Equation" r:id="rId4" imgW="1308100" imgH="444500" progId="Equation.3">
+                <p:oleObj spid="_x0000_s762029" name="Equation" r:id="rId4" imgW="1308100" imgH="444500" progId="Equation.3">
                   <p:embed/>
                 </p:oleObj>
               </mc:Choice>
@@ -33839,7 +33830,7 @@
           <a:graphicData uri="http://schemas.openxmlformats.org/presentationml/2006/ole">
             <mc:AlternateContent xmlns:mc="http://schemas.openxmlformats.org/markup-compatibility/2006">
               <mc:Choice xmlns:v="urn:schemas-microsoft-com:vml" Requires="v">
-                <p:oleObj spid="_x0000_s762027" name="Equation" r:id="rId6" imgW="774700" imgH="444500" progId="Equation.3">
+                <p:oleObj spid="_x0000_s762030" name="Equation" r:id="rId6" imgW="774700" imgH="444500" progId="Equation.3">
                   <p:embed/>
                 </p:oleObj>
               </mc:Choice>
@@ -34073,7 +34064,7 @@
           <a:graphicData uri="http://schemas.openxmlformats.org/presentationml/2006/ole">
             <mc:AlternateContent xmlns:mc="http://schemas.openxmlformats.org/markup-compatibility/2006">
               <mc:Choice xmlns:v="urn:schemas-microsoft-com:vml" Requires="v">
-                <p:oleObj spid="_x0000_s762967" name="Equation" r:id="rId4" imgW="1993900" imgH="457200" progId="Equation.3">
+                <p:oleObj spid="_x0000_s762969" name="Equation" r:id="rId4" imgW="1993900" imgH="457200" progId="Equation.3">
                   <p:embed/>
                 </p:oleObj>
               </mc:Choice>
@@ -34317,7 +34308,7 @@
           <a:p>
             <a:fld id="{7053BEFA-1175-F644-B249-7D41D72BD3FF}" type="datetime1">
               <a:rPr lang="en-US" smtClean="0"/>
-              <a:t>3/28/16</a:t>
+              <a:t>4/7/16</a:t>
             </a:fld>
             <a:endParaRPr lang="en-US"/>
           </a:p>
@@ -34736,7 +34727,7 @@
           <a:p>
             <a:fld id="{7053BEFA-1175-F644-B249-7D41D72BD3FF}" type="datetime1">
               <a:rPr lang="en-US" smtClean="0"/>
-              <a:t>3/28/16</a:t>
+              <a:t>4/7/16</a:t>
             </a:fld>
             <a:endParaRPr lang="en-US"/>
           </a:p>

</xml_diff>